<commit_message>
update to install 2019
</commit_message>
<xml_diff>
--- a/DSC_SQLServer/Desired State Configuration.pptx
+++ b/DSC_SQLServer/Desired State Configuration.pptx
@@ -15505,7 +15505,7 @@
           <a:p>
             <a:fld id="{2E00AF48-965F-4E24-958A-22D9B1DB6CCE}" type="datetimeFigureOut">
               <a:rPr lang="en-US" smtClean="0"/>
-              <a:t>3/7/2020</a:t>
+              <a:t>7/16/2020</a:t>
             </a:fld>
             <a:endParaRPr lang="en-US"/>
           </a:p>
@@ -17256,6 +17256,15 @@
           <a:p>
             <a:endParaRPr lang="en-US" dirty="0"/>
           </a:p>
+          <a:p>
+            <a:endParaRPr lang="en-US" dirty="0"/>
+          </a:p>
+          <a:p>
+            <a:r>
+              <a:rPr lang="en-US" dirty="0"/>
+              <a:t>Datum - Composite configurations</a:t>
+            </a:r>
+          </a:p>
         </p:txBody>
       </p:sp>
       <p:sp>
@@ -18056,6 +18065,15 @@
             </a:r>
           </a:p>
           <a:p>
+            <a:r>
+              <a:rPr lang="en-US" dirty="0"/>
+              <a:t>7/16/2020 – 1,753</a:t>
+            </a:r>
+          </a:p>
+          <a:p>
+            <a:endParaRPr lang="en-US" dirty="0"/>
+          </a:p>
+          <a:p>
             <a:endParaRPr lang="en-US" dirty="0"/>
           </a:p>
           <a:p>
@@ -18065,7 +18083,7 @@
             </a:r>
             <a:r>
               <a:rPr lang="en-US" dirty="0"/>
-              <a:t> has 34 resources</a:t>
+              <a:t> has 40 resources</a:t>
             </a:r>
           </a:p>
           <a:p>
@@ -18080,6 +18098,63 @@
               <a:rPr lang="en-US" dirty="0"/>
               <a:t> – Microsoft resources but the x means experimental, so although they are probably ok, you need to be a little more careful.</a:t>
             </a:r>
+          </a:p>
+          <a:p>
+            <a:endParaRPr lang="en-US" dirty="0"/>
+          </a:p>
+          <a:p>
+            <a:r>
+              <a:rPr lang="en-US" dirty="0" err="1"/>
+              <a:t>xAzure</a:t>
+            </a:r>
+            <a:r>
+              <a:rPr lang="en-US" dirty="0"/>
+              <a:t> - </a:t>
+            </a:r>
+            <a:r>
+              <a:rPr lang="en-US" sz="1200" b="0" i="0" kern="1200" dirty="0">
+                <a:solidFill>
+                  <a:schemeClr val="tx1"/>
+                </a:solidFill>
+                <a:effectLst/>
+                <a:latin typeface="+mn-lt"/>
+                <a:ea typeface="+mn-ea"/>
+                <a:cs typeface="+mn-cs"/>
+              </a:rPr>
+              <a:t> </a:t>
+            </a:r>
+            <a:r>
+              <a:rPr lang="en-US" sz="1200" b="0" i="0" kern="1200" dirty="0" err="1">
+                <a:solidFill>
+                  <a:schemeClr val="tx1"/>
+                </a:solidFill>
+                <a:effectLst/>
+                <a:latin typeface="+mn-lt"/>
+                <a:ea typeface="+mn-ea"/>
+                <a:cs typeface="+mn-cs"/>
+              </a:rPr>
+              <a:t>depoying</a:t>
+            </a:r>
+            <a:r>
+              <a:rPr lang="en-US" sz="1200" b="0" i="0" kern="1200" dirty="0">
+                <a:solidFill>
+                  <a:schemeClr val="tx1"/>
+                </a:solidFill>
+                <a:effectLst/>
+                <a:latin typeface="+mn-lt"/>
+                <a:ea typeface="+mn-ea"/>
+                <a:cs typeface="+mn-cs"/>
+              </a:rPr>
+              <a:t> virtual machines in Microsoft Azure</a:t>
+            </a:r>
+            <a:endParaRPr lang="en-US" dirty="0"/>
+          </a:p>
+          <a:p>
+            <a:r>
+              <a:rPr lang="en-US" dirty="0" err="1"/>
+              <a:t>xFailOverCluster</a:t>
+            </a:r>
+            <a:endParaRPr lang="en-US" dirty="0"/>
           </a:p>
           <a:p>
             <a:endParaRPr lang="en-US" dirty="0"/>
@@ -20232,7 +20307,7 @@
           <a:p>
             <a:fld id="{5E8DF979-0883-4463-93EB-16071EEBDB0B}" type="datetimeFigureOut">
               <a:rPr lang="en-US" smtClean="0"/>
-              <a:t>3/7/2020</a:t>
+              <a:t>7/16/2020</a:t>
             </a:fld>
             <a:endParaRPr lang="en-US"/>
           </a:p>
@@ -20744,7 +20819,7 @@
             <a:fld id="{48A87A34-81AB-432B-8DAE-1953F412C126}" type="datetimeFigureOut">
               <a:rPr lang="en-US" smtClean="0"/>
               <a:pPr/>
-              <a:t>3/7/2020</a:t>
+              <a:t>7/16/2020</a:t>
             </a:fld>
             <a:endParaRPr lang="en-US" dirty="0"/>
           </a:p>
@@ -28355,7 +28430,7 @@
             <p:ph idx="1"/>
             <p:extLst>
               <p:ext uri="{D42A27DB-BD31-4B8C-83A1-F6EECF244321}">
-                <p14:modId xmlns:p14="http://schemas.microsoft.com/office/powerpoint/2010/main" val="884062214"/>
+                <p14:modId xmlns:p14="http://schemas.microsoft.com/office/powerpoint/2010/main" val="263180177"/>
               </p:ext>
             </p:extLst>
           </p:nvPr>
@@ -28800,7 +28875,7 @@
                     <a:p>
                       <a:r>
                         <a:rPr lang="en-US" sz="2200" dirty="0" err="1"/>
-                        <a:t>SqlServerConfiguration</a:t>
+                        <a:t>SqlConfiguration</a:t>
                       </a:r>
                       <a:endParaRPr lang="en-US" sz="2200" dirty="0"/>
                     </a:p>

</xml_diff>